<commit_message>
New DBA checks added, pptx updated
</commit_message>
<xml_diff>
--- a/WUG_2020/tSQLt_Introduction/Presentation/WUG_2020_tSQLt_Introduction.pptx
+++ b/WUG_2020/tSQLt_Introduction/Presentation/WUG_2020_tSQLt_Introduction.pptx
@@ -12060,7 +12060,7 @@
           <a:p>
             <a:fld id="{CD6027A1-6757-4913-8F1F-A5CC23DADA6D}" type="datetimeFigureOut">
               <a:rPr lang="en-US" smtClean="0"/>
-              <a:t>06/08//2020</a:t>
+              <a:t>09/08//2020</a:t>
             </a:fld>
             <a:endParaRPr lang="en-US"/>
           </a:p>
@@ -12238,7 +12238,7 @@
           <a:p>
             <a:fld id="{AEDDCBB5-9E8F-4C3C-B3FF-42B56171167A}" type="datetimeFigureOut">
               <a:rPr lang="en-US" smtClean="0"/>
-              <a:t>06/08//2020</a:t>
+              <a:t>09/08//2020</a:t>
             </a:fld>
             <a:endParaRPr lang="en-US"/>
           </a:p>
@@ -17847,6 +17847,53 @@
           </a:extLst>
         </p:spPr>
       </p:pic>
+      <p:pic>
+        <p:nvPicPr>
+          <p:cNvPr id="1026" name="Picture 2" descr="Joyful Craftsmen – Microsoft Data Platform Competence Center">
+            <a:extLst>
+              <a:ext uri="{FF2B5EF4-FFF2-40B4-BE49-F238E27FC236}">
+                <a16:creationId xmlns:a16="http://schemas.microsoft.com/office/drawing/2014/main" id="{6525B04D-1AE3-497A-A054-EB183C1E9082}"/>
+              </a:ext>
+            </a:extLst>
+          </p:cNvPr>
+          <p:cNvPicPr>
+            <a:picLocks noChangeAspect="1" noChangeArrowheads="1"/>
+          </p:cNvPicPr>
+          <p:nvPr/>
+        </p:nvPicPr>
+        <p:blipFill>
+          <a:blip r:embed="rId4" cstate="print">
+            <a:extLst>
+              <a:ext uri="{28A0092B-C50C-407E-A947-70E740481C1C}">
+                <a14:useLocalDpi xmlns:a14="http://schemas.microsoft.com/office/drawing/2010/main" val="0"/>
+              </a:ext>
+            </a:extLst>
+          </a:blip>
+          <a:srcRect/>
+          <a:stretch>
+            <a:fillRect/>
+          </a:stretch>
+        </p:blipFill>
+        <p:spPr bwMode="auto">
+          <a:xfrm>
+            <a:off x="2595092" y="5461807"/>
+            <a:ext cx="1101142" cy="365614"/>
+          </a:xfrm>
+          <a:prstGeom prst="rect">
+            <a:avLst/>
+          </a:prstGeom>
+          <a:noFill/>
+          <a:extLst>
+            <a:ext uri="{909E8E84-426E-40DD-AFC4-6F175D3DCCD1}">
+              <a14:hiddenFill xmlns:a14="http://schemas.microsoft.com/office/drawing/2010/main">
+                <a:solidFill>
+                  <a:srgbClr val="FFFFFF"/>
+                </a:solidFill>
+              </a14:hiddenFill>
+            </a:ext>
+          </a:extLst>
+        </p:spPr>
+      </p:pic>
     </p:spTree>
     <p:custDataLst>
       <p:tags r:id="rId1"/>
@@ -18425,44 +18472,12 @@
             </a:pPr>
             <a:r>
               <a:rPr lang="cs-CZ" sz="2400" dirty="0">
-                <a:solidFill>
-                  <a:prstClr val="black">
-                    <a:lumMod val="75000"/>
-                    <a:lumOff val="25000"/>
-                  </a:prstClr>
-                </a:solidFill>
                 <a:latin typeface="Segoe UI" panose="020B0502040204020203" pitchFamily="34" charset="0"/>
                 <a:cs typeface="Segoe UI" panose="020B0502040204020203" pitchFamily="34" charset="0"/>
               </a:rPr>
-              <a:t>The source </a:t>
-            </a:r>
-            <a:r>
-              <a:rPr lang="cs-CZ" sz="2400" dirty="0">
-                <a:latin typeface="Segoe UI" panose="020B0502040204020203" pitchFamily="34" charset="0"/>
-                <a:cs typeface="Segoe UI" panose="020B0502040204020203" pitchFamily="34" charset="0"/>
-              </a:rPr>
-              <a:t>code and other materials </a:t>
-            </a:r>
-            <a:r>
-              <a:rPr lang="cs-CZ" sz="2400" dirty="0">
-                <a:solidFill>
-                  <a:prstClr val="black">
-                    <a:lumMod val="75000"/>
-                    <a:lumOff val="25000"/>
-                  </a:prstClr>
-                </a:solidFill>
-                <a:latin typeface="Segoe UI" panose="020B0502040204020203" pitchFamily="34" charset="0"/>
-                <a:cs typeface="Segoe UI" panose="020B0502040204020203" pitchFamily="34" charset="0"/>
-              </a:rPr>
-              <a:t>available in my GitHub repository:</a:t>
+              <a:t>The source code and other materials available in my GitHub repository:</a:t>
             </a:r>
             <a:endParaRPr lang="en-US" sz="2400" dirty="0">
-              <a:solidFill>
-                <a:prstClr val="black">
-                  <a:lumMod val="75000"/>
-                  <a:lumOff val="25000"/>
-                </a:prstClr>
-              </a:solidFill>
               <a:latin typeface="Segoe UI" panose="020B0502040204020203" pitchFamily="34" charset="0"/>
               <a:cs typeface="Segoe UI" panose="020B0502040204020203" pitchFamily="34" charset="0"/>
             </a:endParaRPr>

</xml_diff>

<commit_message>
Added DBA Tools based on tSQLt
</commit_message>
<xml_diff>
--- a/WUG_2020/tSQLt_Introduction/Presentation/WUG_2020_tSQLt_Introduction.pptx
+++ b/WUG_2020/tSQLt_Introduction/Presentation/WUG_2020_tSQLt_Introduction.pptx
@@ -5,10 +5,10 @@
     <p:sldMasterId id="2147483660" r:id="rId1"/>
   </p:sldMasterIdLst>
   <p:notesMasterIdLst>
-    <p:notesMasterId r:id="rId13"/>
+    <p:notesMasterId r:id="rId14"/>
   </p:notesMasterIdLst>
   <p:handoutMasterIdLst>
-    <p:handoutMasterId r:id="rId14"/>
+    <p:handoutMasterId r:id="rId15"/>
   </p:handoutMasterIdLst>
   <p:sldIdLst>
     <p:sldId id="259" r:id="rId2"/>
@@ -20,8 +20,9 @@
     <p:sldId id="266" r:id="rId8"/>
     <p:sldId id="269" r:id="rId9"/>
     <p:sldId id="268" r:id="rId10"/>
-    <p:sldId id="270" r:id="rId11"/>
-    <p:sldId id="258" r:id="rId12"/>
+    <p:sldId id="272" r:id="rId11"/>
+    <p:sldId id="270" r:id="rId12"/>
+    <p:sldId id="258" r:id="rId13"/>
   </p:sldIdLst>
   <p:sldSz cx="12192000" cy="6858000"/>
   <p:notesSz cx="6858000" cy="9144000"/>
@@ -12581,7 +12582,7 @@
                 </a:solidFill>
               </a:rPr>
               <a:pPr/>
-              <a:t>11</a:t>
+              <a:t>12</a:t>
             </a:fld>
             <a:endParaRPr lang="cs-CZ" dirty="0">
               <a:solidFill>
@@ -17946,6 +17947,185 @@
           <a:p>
             <a:r>
               <a:rPr lang="en-US" sz="3600" dirty="0"/>
+              <a:t>Available tools based on </a:t>
+            </a:r>
+            <a:r>
+              <a:rPr lang="en-US" sz="3600" dirty="0" err="1"/>
+              <a:t>tSQLt</a:t>
+            </a:r>
+            <a:r>
+              <a:rPr lang="en-US" sz="3600" dirty="0"/>
+              <a:t> – SQL Test, SQL Cop</a:t>
+            </a:r>
+            <a:endParaRPr lang="cs-CZ" sz="3600" dirty="0"/>
+          </a:p>
+        </p:txBody>
+      </p:sp>
+      <p:sp>
+        <p:nvSpPr>
+          <p:cNvPr id="16" name="Slide Number Placeholder 15">
+            <a:extLst>
+              <a:ext uri="{FF2B5EF4-FFF2-40B4-BE49-F238E27FC236}">
+                <a16:creationId xmlns:a16="http://schemas.microsoft.com/office/drawing/2014/main" id="{60B053D5-0B9C-49B0-9A88-7C842B992A56}"/>
+              </a:ext>
+            </a:extLst>
+          </p:cNvPr>
+          <p:cNvSpPr>
+            <a:spLocks noGrp="1"/>
+          </p:cNvSpPr>
+          <p:nvPr>
+            <p:ph type="sldNum" sz="quarter" idx="4"/>
+          </p:nvPr>
+        </p:nvSpPr>
+        <p:spPr>
+          <a:xfrm>
+            <a:off x="11615936" y="6448252"/>
+            <a:ext cx="576064" cy="365125"/>
+          </a:xfrm>
+        </p:spPr>
+        <p:txBody>
+          <a:bodyPr/>
+          <a:lstStyle/>
+          <a:p>
+            <a:fld id="{31EF1479-3489-4788-BFA4-763D4DDB960F}" type="slidenum">
+              <a:rPr lang="cs-CZ" smtClean="0">
+                <a:solidFill>
+                  <a:srgbClr val="1E326C"/>
+                </a:solidFill>
+              </a:rPr>
+              <a:pPr/>
+              <a:t>10</a:t>
+            </a:fld>
+            <a:endParaRPr lang="cs-CZ" dirty="0">
+              <a:solidFill>
+                <a:srgbClr val="1E326C"/>
+              </a:solidFill>
+            </a:endParaRPr>
+          </a:p>
+        </p:txBody>
+      </p:sp>
+      <p:sp>
+        <p:nvSpPr>
+          <p:cNvPr id="15" name="Content Placeholder 14">
+            <a:extLst>
+              <a:ext uri="{FF2B5EF4-FFF2-40B4-BE49-F238E27FC236}">
+                <a16:creationId xmlns:a16="http://schemas.microsoft.com/office/drawing/2014/main" id="{A1B4DD8A-C396-4C94-A9A7-DE8CC7D4B803}"/>
+              </a:ext>
+            </a:extLst>
+          </p:cNvPr>
+          <p:cNvSpPr>
+            <a:spLocks noGrp="1"/>
+          </p:cNvSpPr>
+          <p:nvPr>
+            <p:ph idx="1"/>
+          </p:nvPr>
+        </p:nvSpPr>
+        <p:spPr>
+          <a:xfrm>
+            <a:off x="609600" y="1602658"/>
+            <a:ext cx="10972800" cy="4634654"/>
+          </a:xfrm>
+        </p:spPr>
+        <p:txBody>
+          <a:bodyPr/>
+          <a:lstStyle/>
+          <a:p>
+            <a:r>
+              <a:rPr lang="en-US" dirty="0"/>
+              <a:t>SQL Test by </a:t>
+            </a:r>
+            <a:r>
+              <a:rPr lang="en-US" dirty="0" err="1"/>
+              <a:t>RedGate</a:t>
+            </a:r>
+            <a:r>
+              <a:rPr lang="en-US" dirty="0"/>
+              <a:t>: </a:t>
+            </a:r>
+          </a:p>
+          <a:p>
+            <a:pPr lvl="1"/>
+            <a:r>
+              <a:rPr lang="en-US" dirty="0">
+                <a:hlinkClick r:id="rId2"/>
+              </a:rPr>
+              <a:t>https://www.red-gate.com/products/sql-development/sql-test/</a:t>
+            </a:r>
+            <a:endParaRPr lang="en-US" dirty="0"/>
+          </a:p>
+          <a:p>
+            <a:endParaRPr lang="en-US" dirty="0"/>
+          </a:p>
+          <a:p>
+            <a:r>
+              <a:rPr lang="en-US" dirty="0"/>
+              <a:t>SQL Cop repository: </a:t>
+            </a:r>
+          </a:p>
+          <a:p>
+            <a:pPr lvl="1"/>
+            <a:r>
+              <a:rPr lang="en-US" dirty="0">
+                <a:hlinkClick r:id="rId3"/>
+              </a:rPr>
+              <a:t>https://github.com/red-gate/SQLCop</a:t>
+            </a:r>
+            <a:endParaRPr lang="en-US" dirty="0"/>
+          </a:p>
+          <a:p>
+            <a:endParaRPr lang="en-US" dirty="0"/>
+          </a:p>
+        </p:txBody>
+      </p:sp>
+    </p:spTree>
+    <p:extLst>
+      <p:ext uri="{BB962C8B-B14F-4D97-AF65-F5344CB8AC3E}">
+        <p14:creationId xmlns:p14="http://schemas.microsoft.com/office/powerpoint/2010/main" val="2252047410"/>
+      </p:ext>
+    </p:extLst>
+  </p:cSld>
+  <p:clrMapOvr>
+    <a:masterClrMapping/>
+  </p:clrMapOvr>
+</p:sld>
+</file>
+
+<file path=ppt/slides/slide11.xml><?xml version="1.0" encoding="utf-8"?>
+<p:sld xmlns:a="http://schemas.openxmlformats.org/drawingml/2006/main" xmlns:r="http://schemas.openxmlformats.org/officeDocument/2006/relationships" xmlns:p="http://schemas.openxmlformats.org/presentationml/2006/main">
+  <p:cSld>
+    <p:spTree>
+      <p:nvGrpSpPr>
+        <p:cNvPr id="1" name=""/>
+        <p:cNvGrpSpPr/>
+        <p:nvPr/>
+      </p:nvGrpSpPr>
+      <p:grpSpPr>
+        <a:xfrm>
+          <a:off x="0" y="0"/>
+          <a:ext cx="0" cy="0"/>
+          <a:chOff x="0" y="0"/>
+          <a:chExt cx="0" cy="0"/>
+        </a:xfrm>
+      </p:grpSpPr>
+      <p:sp>
+        <p:nvSpPr>
+          <p:cNvPr id="2" name="Title 1"/>
+          <p:cNvSpPr>
+            <a:spLocks noGrp="1"/>
+          </p:cNvSpPr>
+          <p:nvPr>
+            <p:ph type="title"/>
+          </p:nvPr>
+        </p:nvSpPr>
+        <p:spPr/>
+        <p:txBody>
+          <a:bodyPr>
+            <a:normAutofit/>
+          </a:bodyPr>
+          <a:lstStyle/>
+          <a:p>
+            <a:r>
+              <a:rPr lang="en-US" sz="3600" dirty="0"/>
               <a:t>Sources</a:t>
             </a:r>
             <a:endParaRPr lang="cs-CZ" sz="3600" dirty="0"/>
@@ -17985,7 +18165,7 @@
                 </a:solidFill>
               </a:rPr>
               <a:pPr/>
-              <a:t>10</a:t>
+              <a:t>11</a:t>
             </a:fld>
             <a:endParaRPr lang="cs-CZ" dirty="0">
               <a:solidFill>
@@ -18497,7 +18677,7 @@
 </p:sld>
 </file>
 
-<file path=ppt/slides/slide11.xml><?xml version="1.0" encoding="utf-8"?>
+<file path=ppt/slides/slide12.xml><?xml version="1.0" encoding="utf-8"?>
 <p:sld xmlns:a="http://schemas.openxmlformats.org/drawingml/2006/main" xmlns:r="http://schemas.openxmlformats.org/officeDocument/2006/relationships" xmlns:p="http://schemas.openxmlformats.org/presentationml/2006/main">
   <p:cSld>
     <p:spTree>

</xml_diff>

<commit_message>
Added DBA tools, fixed DBCheck test execution
</commit_message>
<xml_diff>
--- a/WUG_2020/tSQLt_Introduction/Presentation/WUG_2020_tSQLt_Introduction.pptx
+++ b/WUG_2020/tSQLt_Introduction/Presentation/WUG_2020_tSQLt_Introduction.pptx
@@ -18022,8 +18022,8 @@
         </p:nvSpPr>
         <p:spPr>
           <a:xfrm>
-            <a:off x="609600" y="1602658"/>
-            <a:ext cx="10972800" cy="4634654"/>
+            <a:off x="609600" y="1828800"/>
+            <a:ext cx="10972800" cy="4408512"/>
           </a:xfrm>
         </p:spPr>
         <p:txBody>
@@ -18035,7 +18035,11 @@
               <a:t>SQL Test by </a:t>
             </a:r>
             <a:r>
-              <a:rPr lang="en-US" dirty="0" err="1"/>
+              <a:rPr lang="en-US" b="1" dirty="0" err="1">
+                <a:solidFill>
+                  <a:schemeClr val="accent4"/>
+                </a:solidFill>
+              </a:rPr>
               <a:t>RedGate</a:t>
             </a:r>
             <a:r>
@@ -18058,8 +18062,16 @@
           </a:p>
           <a:p>
             <a:r>
+              <a:rPr lang="en-US" b="1" dirty="0" err="1">
+                <a:solidFill>
+                  <a:srgbClr val="00B0F0"/>
+                </a:solidFill>
+              </a:rPr>
+              <a:t>SQLCop</a:t>
+            </a:r>
+            <a:r>
               <a:rPr lang="en-US" dirty="0"/>
-              <a:t>SQL Cop repository: </a:t>
+              <a:t> repository: </a:t>
             </a:r>
           </a:p>
           <a:p>
@@ -18077,6 +18089,53 @@
           </a:p>
         </p:txBody>
       </p:sp>
+      <p:pic>
+        <p:nvPicPr>
+          <p:cNvPr id="1028" name="Picture 4" descr="icon-tools - UNC Human Resources">
+            <a:extLst>
+              <a:ext uri="{FF2B5EF4-FFF2-40B4-BE49-F238E27FC236}">
+                <a16:creationId xmlns:a16="http://schemas.microsoft.com/office/drawing/2014/main" id="{9C42E43F-F847-4689-BF27-CAB05E17172B}"/>
+              </a:ext>
+            </a:extLst>
+          </p:cNvPr>
+          <p:cNvPicPr>
+            <a:picLocks noChangeAspect="1" noChangeArrowheads="1"/>
+          </p:cNvPicPr>
+          <p:nvPr/>
+        </p:nvPicPr>
+        <p:blipFill>
+          <a:blip r:embed="rId4">
+            <a:extLst>
+              <a:ext uri="{28A0092B-C50C-407E-A947-70E740481C1C}">
+                <a14:useLocalDpi xmlns:a14="http://schemas.microsoft.com/office/drawing/2010/main" val="0"/>
+              </a:ext>
+            </a:extLst>
+          </a:blip>
+          <a:srcRect/>
+          <a:stretch>
+            <a:fillRect/>
+          </a:stretch>
+        </p:blipFill>
+        <p:spPr bwMode="auto">
+          <a:xfrm>
+            <a:off x="9173496" y="4033056"/>
+            <a:ext cx="1936955" cy="1936955"/>
+          </a:xfrm>
+          <a:prstGeom prst="rect">
+            <a:avLst/>
+          </a:prstGeom>
+          <a:noFill/>
+          <a:extLst>
+            <a:ext uri="{909E8E84-426E-40DD-AFC4-6F175D3DCCD1}">
+              <a14:hiddenFill xmlns:a14="http://schemas.microsoft.com/office/drawing/2010/main">
+                <a:solidFill>
+                  <a:srgbClr val="FFFFFF"/>
+                </a:solidFill>
+              </a14:hiddenFill>
+            </a:ext>
+          </a:extLst>
+        </p:spPr>
+      </p:pic>
     </p:spTree>
     <p:extLst>
       <p:ext uri="{BB962C8B-B14F-4D97-AF65-F5344CB8AC3E}">

</xml_diff>